<commit_message>
Access Specfiers and Modfied Object commit
</commit_message>
<xml_diff>
--- a/Fundamentals_Of_OOPS.pptx
+++ b/Fundamentals_Of_OOPS.pptx
@@ -8,13 +8,16 @@
     <p:sldId id="256" r:id="rId2"/>
     <p:sldId id="260" r:id="rId3"/>
     <p:sldId id="257" r:id="rId4"/>
-    <p:sldId id="261" r:id="rId5"/>
-    <p:sldId id="262" r:id="rId6"/>
-    <p:sldId id="258" r:id="rId7"/>
-    <p:sldId id="259" r:id="rId8"/>
-    <p:sldId id="263" r:id="rId9"/>
-    <p:sldId id="264" r:id="rId10"/>
-    <p:sldId id="265" r:id="rId11"/>
+    <p:sldId id="266" r:id="rId5"/>
+    <p:sldId id="267" r:id="rId6"/>
+    <p:sldId id="268" r:id="rId7"/>
+    <p:sldId id="261" r:id="rId8"/>
+    <p:sldId id="262" r:id="rId9"/>
+    <p:sldId id="258" r:id="rId10"/>
+    <p:sldId id="259" r:id="rId11"/>
+    <p:sldId id="263" r:id="rId12"/>
+    <p:sldId id="264" r:id="rId13"/>
+    <p:sldId id="265" r:id="rId14"/>
   </p:sldIdLst>
   <p:sldSz cx="12192000" cy="6858000"/>
   <p:notesSz cx="6858000" cy="9144000"/>
@@ -113,6 +116,11 @@
       </a:defRPr>
     </a:lvl9pPr>
   </p:defaultTextStyle>
+  <p:extLst>
+    <p:ext uri="{EFAFB233-063F-42B5-8137-9DF3F51BA10A}">
+      <p15:sldGuideLst xmlns:p15="http://schemas.microsoft.com/office/powerpoint/2012/main"/>
+    </p:ext>
+  </p:extLst>
 </p:presentation>
 </file>
 
@@ -763,7 +771,7 @@
             <a:fld id="{5923F103-BC34-4FE4-A40E-EDDEECFDA5D0}" type="datetimeFigureOut">
               <a:rPr lang="en-US" smtClean="0"/>
               <a:pPr/>
-              <a:t>7/23/2024</a:t>
+              <a:t>7/25/2024</a:t>
             </a:fld>
             <a:endParaRPr lang="en-US" dirty="0"/>
           </a:p>
@@ -1884,7 +1892,7 @@
           <a:p>
             <a:fld id="{923A1CC3-2375-41D4-9E03-427CAF2A4C1A}" type="datetimeFigureOut">
               <a:rPr lang="en-US" smtClean="0"/>
-              <a:t>7/23/2024</a:t>
+              <a:t>7/25/2024</a:t>
             </a:fld>
             <a:endParaRPr lang="en-US" dirty="0"/>
           </a:p>
@@ -2896,7 +2904,7 @@
           <a:p>
             <a:fld id="{AFF16868-8199-4C2C-A5B1-63AEE139F88E}" type="datetimeFigureOut">
               <a:rPr lang="en-US" smtClean="0"/>
-              <a:t>7/23/2024</a:t>
+              <a:t>7/25/2024</a:t>
             </a:fld>
             <a:endParaRPr lang="en-US" dirty="0"/>
           </a:p>
@@ -4067,7 +4075,7 @@
           <a:p>
             <a:fld id="{AAD9FF7F-6988-44CC-821B-644E70CD2F73}" type="datetimeFigureOut">
               <a:rPr lang="en-US" smtClean="0"/>
-              <a:t>7/23/2024</a:t>
+              <a:t>7/25/2024</a:t>
             </a:fld>
             <a:endParaRPr lang="en-US" dirty="0"/>
           </a:p>
@@ -5129,7 +5137,7 @@
           <a:p>
             <a:fld id="{5C12C299-16B2-4475-990D-751901EACC14}" type="datetimeFigureOut">
               <a:rPr lang="en-US" smtClean="0"/>
-              <a:t>7/23/2024</a:t>
+              <a:t>7/25/2024</a:t>
             </a:fld>
             <a:endParaRPr lang="en-US" dirty="0"/>
           </a:p>
@@ -5776,7 +5784,7 @@
           <a:p>
             <a:fld id="{9FE86839-B9D8-4651-8783-F325ECE74E65}" type="datetimeFigureOut">
               <a:rPr lang="en-US" smtClean="0"/>
-              <a:t>7/23/2024</a:t>
+              <a:t>7/25/2024</a:t>
             </a:fld>
             <a:endParaRPr lang="en-US" dirty="0"/>
           </a:p>
@@ -6624,7 +6632,7 @@
           <a:p>
             <a:fld id="{FD484F64-32F6-45C5-931F-ADC1662401D0}" type="datetimeFigureOut">
               <a:rPr lang="en-US" smtClean="0"/>
-              <a:t>7/23/2024</a:t>
+              <a:t>7/25/2024</a:t>
             </a:fld>
             <a:endParaRPr lang="en-US" dirty="0"/>
           </a:p>
@@ -6800,7 +6808,7 @@
           <a:p>
             <a:fld id="{53086D93-FCAC-47E0-A2EE-787E62CA814C}" type="datetimeFigureOut">
               <a:rPr lang="en-US" smtClean="0"/>
-              <a:t>7/23/2024</a:t>
+              <a:t>7/25/2024</a:t>
             </a:fld>
             <a:endParaRPr lang="en-US" dirty="0"/>
           </a:p>
@@ -7799,7 +7807,7 @@
           <a:p>
             <a:fld id="{CDA879A6-0FD0-4734-A311-86BFCA472E6E}" type="datetimeFigureOut">
               <a:rPr lang="en-US" smtClean="0"/>
-              <a:t>7/23/2024</a:t>
+              <a:t>7/25/2024</a:t>
             </a:fld>
             <a:endParaRPr lang="en-US" dirty="0"/>
           </a:p>
@@ -8006,7 +8014,7 @@
           <a:p>
             <a:fld id="{19C9CA7B-DFD4-44B5-8C60-D14B8CD1FB59}" type="datetimeFigureOut">
               <a:rPr lang="en-US" smtClean="0"/>
-              <a:t>7/23/2024</a:t>
+              <a:t>7/25/2024</a:t>
             </a:fld>
             <a:endParaRPr lang="en-US" dirty="0"/>
           </a:p>
@@ -9069,7 +9077,7 @@
           <a:p>
             <a:fld id="{F34E6425-0181-43F2-84FC-787E803FD2F8}" type="datetimeFigureOut">
               <a:rPr lang="en-US" smtClean="0"/>
-              <a:t>7/23/2024</a:t>
+              <a:t>7/25/2024</a:t>
             </a:fld>
             <a:endParaRPr lang="en-US" dirty="0"/>
           </a:p>
@@ -9342,7 +9350,7 @@
           <a:p>
             <a:fld id="{3BDB8791-F1B0-41E7-B7FD-A781E65C4266}" type="datetimeFigureOut">
               <a:rPr lang="en-US" smtClean="0"/>
-              <a:t>7/23/2024</a:t>
+              <a:t>7/25/2024</a:t>
             </a:fld>
             <a:endParaRPr lang="en-US" dirty="0"/>
           </a:p>
@@ -9725,7 +9733,7 @@
           <a:p>
             <a:fld id="{5FDD63B2-E120-4ED8-B27B-C685F510A5FE}" type="datetimeFigureOut">
               <a:rPr lang="en-US" smtClean="0"/>
-              <a:t>7/23/2024</a:t>
+              <a:t>7/25/2024</a:t>
             </a:fld>
             <a:endParaRPr lang="en-US" dirty="0"/>
           </a:p>
@@ -9844,7 +9852,7 @@
           <a:p>
             <a:fld id="{7AA18ACC-A947-437B-A130-35BD54FDF1E9}" type="datetimeFigureOut">
               <a:rPr lang="en-US" smtClean="0"/>
-              <a:t>7/23/2024</a:t>
+              <a:t>7/25/2024</a:t>
             </a:fld>
             <a:endParaRPr lang="en-US" dirty="0"/>
           </a:p>
@@ -9940,7 +9948,7 @@
           <a:p>
             <a:fld id="{7C8D7E02-BCB8-4D50-A234-369438C08659}" type="datetimeFigureOut">
               <a:rPr lang="en-US" smtClean="0"/>
-              <a:t>7/23/2024</a:t>
+              <a:t>7/25/2024</a:t>
             </a:fld>
             <a:endParaRPr lang="en-US" dirty="0"/>
           </a:p>
@@ -11050,7 +11058,7 @@
           <a:p>
             <a:fld id="{76E86A4C-8E40-4F87-A4F0-01A0687C5742}" type="datetimeFigureOut">
               <a:rPr lang="en-US" smtClean="0"/>
-              <a:t>7/23/2024</a:t>
+              <a:t>7/25/2024</a:t>
             </a:fld>
             <a:endParaRPr lang="en-US" dirty="0"/>
           </a:p>
@@ -12184,7 +12192,7 @@
           <a:p>
             <a:fld id="{35E72C73-2D91-4E12-BA25-F0AA0C03599B}" type="datetimeFigureOut">
               <a:rPr lang="en-US" smtClean="0"/>
-              <a:t>7/23/2024</a:t>
+              <a:t>7/25/2024</a:t>
             </a:fld>
             <a:endParaRPr lang="en-US" dirty="0"/>
           </a:p>
@@ -13213,7 +13221,7 @@
           <a:p>
             <a:fld id="{2BE451C3-0FF4-47C4-B829-773ADF60F88C}" type="datetimeFigureOut">
               <a:rPr lang="en-US" smtClean="0"/>
-              <a:t>7/23/2024</a:t>
+              <a:t>7/25/2024</a:t>
             </a:fld>
             <a:endParaRPr lang="en-US" dirty="0"/>
           </a:p>
@@ -13868,10 +13876,513 @@
   <p:clrMapOvr>
     <a:masterClrMapping/>
   </p:clrMapOvr>
+  <p:timing>
+    <p:tnLst>
+      <p:par>
+        <p:cTn id="1" dur="indefinite" restart="never" nodeType="tmRoot"/>
+      </p:par>
+    </p:tnLst>
+  </p:timing>
 </p:sld>
 </file>
 
 <file path=ppt/slides/slide10.xml><?xml version="1.0" encoding="utf-8"?>
+<p:sld xmlns:a="http://schemas.openxmlformats.org/drawingml/2006/main" xmlns:r="http://schemas.openxmlformats.org/officeDocument/2006/relationships" xmlns:p="http://schemas.openxmlformats.org/presentationml/2006/main">
+  <p:cSld>
+    <p:spTree>
+      <p:nvGrpSpPr>
+        <p:cNvPr id="1" name=""/>
+        <p:cNvGrpSpPr/>
+        <p:nvPr/>
+      </p:nvGrpSpPr>
+      <p:grpSpPr>
+        <a:xfrm>
+          <a:off x="0" y="0"/>
+          <a:ext cx="0" cy="0"/>
+          <a:chOff x="0" y="0"/>
+          <a:chExt cx="0" cy="0"/>
+        </a:xfrm>
+      </p:grpSpPr>
+      <p:sp>
+        <p:nvSpPr>
+          <p:cNvPr id="2" name="Title 1"/>
+          <p:cNvSpPr>
+            <a:spLocks noGrp="1"/>
+          </p:cNvSpPr>
+          <p:nvPr>
+            <p:ph type="title"/>
+          </p:nvPr>
+        </p:nvSpPr>
+        <p:spPr>
+          <a:xfrm>
+            <a:off x="585110" y="695372"/>
+            <a:ext cx="8761413" cy="706964"/>
+          </a:xfrm>
+        </p:spPr>
+        <p:txBody>
+          <a:bodyPr/>
+          <a:lstStyle/>
+          <a:p>
+            <a:r>
+              <a:rPr lang="en-US" b="1" dirty="0" smtClean="0"/>
+              <a:t>What is Class?</a:t>
+            </a:r>
+            <a:endParaRPr lang="en-IN" b="1" dirty="0"/>
+          </a:p>
+        </p:txBody>
+      </p:sp>
+      <p:sp>
+        <p:nvSpPr>
+          <p:cNvPr id="3" name="Content Placeholder 2"/>
+          <p:cNvSpPr>
+            <a:spLocks noGrp="1"/>
+          </p:cNvSpPr>
+          <p:nvPr>
+            <p:ph idx="1"/>
+          </p:nvPr>
+        </p:nvSpPr>
+        <p:spPr>
+          <a:xfrm>
+            <a:off x="585110" y="2266123"/>
+            <a:ext cx="10838264" cy="4121426"/>
+          </a:xfrm>
+        </p:spPr>
+        <p:txBody>
+          <a:bodyPr>
+            <a:normAutofit fontScale="85000" lnSpcReduction="20000"/>
+          </a:bodyPr>
+          <a:lstStyle/>
+          <a:p>
+            <a:pPr algn="just">
+              <a:lnSpc>
+                <a:spcPct val="120000"/>
+              </a:lnSpc>
+            </a:pPr>
+            <a:r>
+              <a:rPr lang="en-US" sz="2000" dirty="0" smtClean="0"/>
+              <a:t>Class is a blue print of an object</a:t>
+            </a:r>
+            <a:r>
+              <a:rPr lang="en-IN" sz="2000" dirty="0" smtClean="0"/>
+              <a:t>.</a:t>
+            </a:r>
+          </a:p>
+          <a:p>
+            <a:pPr algn="just">
+              <a:lnSpc>
+                <a:spcPct val="120000"/>
+              </a:lnSpc>
+            </a:pPr>
+            <a:r>
+              <a:rPr lang="en-US" sz="2000" dirty="0"/>
+              <a:t>A </a:t>
+            </a:r>
+            <a:r>
+              <a:rPr lang="en-US" sz="2000" b="1" dirty="0"/>
+              <a:t>class in Java</a:t>
+            </a:r>
+            <a:r>
+              <a:rPr lang="en-US" sz="2000" dirty="0"/>
+              <a:t> is a fundamental building block of object-oriented programming (OOP) language. In other words, a class is the basic unit of OOP.</a:t>
+            </a:r>
+          </a:p>
+          <a:p>
+            <a:pPr algn="just">
+              <a:lnSpc>
+                <a:spcPct val="120000"/>
+              </a:lnSpc>
+            </a:pPr>
+            <a:r>
+              <a:rPr lang="en-US" sz="2000" dirty="0"/>
+              <a:t>According to OOPs concept in Java, a class is the blueprint/template of an object. It contains the similar types of objects having the same states (properties) and behavior.</a:t>
+            </a:r>
+          </a:p>
+          <a:p>
+            <a:pPr algn="just">
+              <a:lnSpc>
+                <a:spcPct val="120000"/>
+              </a:lnSpc>
+            </a:pPr>
+            <a:r>
+              <a:rPr lang="en-US" sz="2000" dirty="0"/>
+              <a:t>In other words, a class can also be defined as “a class is a group of objects which are common to all objects of one type</a:t>
+            </a:r>
+            <a:r>
+              <a:rPr lang="en-US" sz="2000" dirty="0" smtClean="0"/>
+              <a:t>”.</a:t>
+            </a:r>
+          </a:p>
+          <a:p>
+            <a:pPr algn="just">
+              <a:lnSpc>
+                <a:spcPct val="120000"/>
+              </a:lnSpc>
+            </a:pPr>
+            <a:r>
+              <a:rPr lang="en-US" b="1" dirty="0"/>
+              <a:t>Syntax to Declare Class in Java</a:t>
+            </a:r>
+          </a:p>
+          <a:p>
+            <a:pPr lvl="1" algn="just">
+              <a:lnSpc>
+                <a:spcPct val="120000"/>
+              </a:lnSpc>
+            </a:pPr>
+            <a:r>
+              <a:rPr lang="en-US" sz="1800" dirty="0" err="1" smtClean="0"/>
+              <a:t>access_modifier</a:t>
+            </a:r>
+            <a:r>
+              <a:rPr lang="en-US" sz="1800" dirty="0" smtClean="0"/>
+              <a:t> </a:t>
+            </a:r>
+            <a:r>
+              <a:rPr lang="en-US" sz="1800" dirty="0" err="1" smtClean="0"/>
+              <a:t>Class_Name</a:t>
+            </a:r>
+            <a:endParaRPr lang="en-US" sz="1800" dirty="0" smtClean="0"/>
+          </a:p>
+          <a:p>
+            <a:pPr lvl="1" algn="just">
+              <a:lnSpc>
+                <a:spcPct val="120000"/>
+              </a:lnSpc>
+            </a:pPr>
+            <a:r>
+              <a:rPr lang="en-US" sz="1800" dirty="0" smtClean="0"/>
+              <a:t>{</a:t>
+            </a:r>
+          </a:p>
+          <a:p>
+            <a:pPr marL="457200" lvl="1" indent="0" algn="just">
+              <a:lnSpc>
+                <a:spcPct val="120000"/>
+              </a:lnSpc>
+              <a:buNone/>
+            </a:pPr>
+            <a:r>
+              <a:rPr lang="en-US" sz="1800" dirty="0" smtClean="0"/>
+              <a:t>		// class body</a:t>
+            </a:r>
+            <a:endParaRPr lang="en-US" sz="1800" dirty="0"/>
+          </a:p>
+          <a:p>
+            <a:pPr lvl="1" algn="just">
+              <a:lnSpc>
+                <a:spcPct val="120000"/>
+              </a:lnSpc>
+            </a:pPr>
+            <a:r>
+              <a:rPr lang="en-US" sz="1800" dirty="0" smtClean="0"/>
+              <a:t>}</a:t>
+            </a:r>
+          </a:p>
+          <a:p>
+            <a:pPr marL="0" indent="0" algn="just">
+              <a:lnSpc>
+                <a:spcPct val="120000"/>
+              </a:lnSpc>
+              <a:buNone/>
+            </a:pPr>
+            <a:endParaRPr lang="en-US" sz="2000" dirty="0"/>
+          </a:p>
+          <a:p>
+            <a:pPr algn="just">
+              <a:lnSpc>
+                <a:spcPct val="120000"/>
+              </a:lnSpc>
+            </a:pPr>
+            <a:endParaRPr lang="en-US" sz="2000" dirty="0" smtClean="0"/>
+          </a:p>
+        </p:txBody>
+      </p:sp>
+    </p:spTree>
+    <p:extLst>
+      <p:ext uri="{BB962C8B-B14F-4D97-AF65-F5344CB8AC3E}">
+        <p14:creationId xmlns:p14="http://schemas.microsoft.com/office/powerpoint/2010/main" val="3451203344"/>
+      </p:ext>
+    </p:extLst>
+  </p:cSld>
+  <p:clrMapOvr>
+    <a:masterClrMapping/>
+  </p:clrMapOvr>
+</p:sld>
+</file>
+
+<file path=ppt/slides/slide11.xml><?xml version="1.0" encoding="utf-8"?>
+<p:sld xmlns:a="http://schemas.openxmlformats.org/drawingml/2006/main" xmlns:r="http://schemas.openxmlformats.org/officeDocument/2006/relationships" xmlns:p="http://schemas.openxmlformats.org/presentationml/2006/main">
+  <p:cSld>
+    <p:spTree>
+      <p:nvGrpSpPr>
+        <p:cNvPr id="1" name=""/>
+        <p:cNvGrpSpPr/>
+        <p:nvPr/>
+      </p:nvGrpSpPr>
+      <p:grpSpPr>
+        <a:xfrm>
+          <a:off x="0" y="0"/>
+          <a:ext cx="0" cy="0"/>
+          <a:chOff x="0" y="0"/>
+          <a:chExt cx="0" cy="0"/>
+        </a:xfrm>
+      </p:grpSpPr>
+      <p:sp>
+        <p:nvSpPr>
+          <p:cNvPr id="2" name="Title 1"/>
+          <p:cNvSpPr>
+            <a:spLocks noGrp="1"/>
+          </p:cNvSpPr>
+          <p:nvPr>
+            <p:ph type="title"/>
+          </p:nvPr>
+        </p:nvSpPr>
+        <p:spPr>
+          <a:xfrm>
+            <a:off x="677874" y="854398"/>
+            <a:ext cx="8761413" cy="706964"/>
+          </a:xfrm>
+        </p:spPr>
+        <p:txBody>
+          <a:bodyPr/>
+          <a:lstStyle/>
+          <a:p>
+            <a:r>
+              <a:rPr lang="en-US" b="1" dirty="0" smtClean="0"/>
+              <a:t>Components Of Class</a:t>
+            </a:r>
+            <a:endParaRPr lang="en-IN" b="1" dirty="0"/>
+          </a:p>
+        </p:txBody>
+      </p:sp>
+      <p:pic>
+        <p:nvPicPr>
+          <p:cNvPr id="4" name="Content Placeholder 3"/>
+          <p:cNvPicPr>
+            <a:picLocks noGrp="1" noChangeAspect="1"/>
+          </p:cNvPicPr>
+          <p:nvPr>
+            <p:ph idx="1"/>
+          </p:nvPr>
+        </p:nvPicPr>
+        <p:blipFill>
+          <a:blip r:embed="rId2">
+            <a:duotone>
+              <a:schemeClr val="accent1">
+                <a:shade val="45000"/>
+                <a:satMod val="135000"/>
+              </a:schemeClr>
+              <a:prstClr val="white"/>
+            </a:duotone>
+            <a:extLst>
+              <a:ext uri="{28A0092B-C50C-407E-A947-70E740481C1C}">
+                <a14:useLocalDpi xmlns:a14="http://schemas.microsoft.com/office/drawing/2010/main" val="0"/>
+              </a:ext>
+            </a:extLst>
+          </a:blip>
+          <a:stretch>
+            <a:fillRect/>
+          </a:stretch>
+        </p:blipFill>
+        <p:spPr>
+          <a:xfrm>
+            <a:off x="2637184" y="2419135"/>
+            <a:ext cx="6016486" cy="4272889"/>
+          </a:xfrm>
+        </p:spPr>
+      </p:pic>
+    </p:spTree>
+    <p:extLst>
+      <p:ext uri="{BB962C8B-B14F-4D97-AF65-F5344CB8AC3E}">
+        <p14:creationId xmlns:p14="http://schemas.microsoft.com/office/powerpoint/2010/main" val="76220320"/>
+      </p:ext>
+    </p:extLst>
+  </p:cSld>
+  <p:clrMapOvr>
+    <a:masterClrMapping/>
+  </p:clrMapOvr>
+</p:sld>
+</file>
+
+<file path=ppt/slides/slide12.xml><?xml version="1.0" encoding="utf-8"?>
+<p:sld xmlns:a="http://schemas.openxmlformats.org/drawingml/2006/main" xmlns:r="http://schemas.openxmlformats.org/officeDocument/2006/relationships" xmlns:p="http://schemas.openxmlformats.org/presentationml/2006/main">
+  <p:cSld>
+    <p:spTree>
+      <p:nvGrpSpPr>
+        <p:cNvPr id="1" name=""/>
+        <p:cNvGrpSpPr/>
+        <p:nvPr/>
+      </p:nvGrpSpPr>
+      <p:grpSpPr>
+        <a:xfrm>
+          <a:off x="0" y="0"/>
+          <a:ext cx="0" cy="0"/>
+          <a:chOff x="0" y="0"/>
+          <a:chExt cx="0" cy="0"/>
+        </a:xfrm>
+      </p:grpSpPr>
+      <p:sp>
+        <p:nvSpPr>
+          <p:cNvPr id="3" name="Content Placeholder 2"/>
+          <p:cNvSpPr>
+            <a:spLocks noGrp="1"/>
+          </p:cNvSpPr>
+          <p:nvPr>
+            <p:ph idx="1"/>
+          </p:nvPr>
+        </p:nvSpPr>
+        <p:spPr>
+          <a:xfrm>
+            <a:off x="424070" y="2411896"/>
+            <a:ext cx="11158330" cy="4280452"/>
+          </a:xfrm>
+        </p:spPr>
+        <p:txBody>
+          <a:bodyPr>
+            <a:normAutofit fontScale="85000" lnSpcReduction="10000"/>
+          </a:bodyPr>
+          <a:lstStyle/>
+          <a:p>
+            <a:pPr marL="0" indent="0" algn="just">
+              <a:lnSpc>
+                <a:spcPct val="150000"/>
+              </a:lnSpc>
+              <a:buNone/>
+            </a:pPr>
+            <a:r>
+              <a:rPr lang="en-US" dirty="0"/>
+              <a:t>1. </a:t>
+            </a:r>
+            <a:r>
+              <a:rPr lang="en-US" b="1" dirty="0"/>
+              <a:t>Modifiers:</a:t>
+            </a:r>
+            <a:r>
+              <a:rPr lang="en-US" dirty="0"/>
+              <a:t> A class can be either a public or default access modifier. But the members of class can be public, private, default, and protected. All these are the access modifiers.</a:t>
+            </a:r>
+          </a:p>
+          <a:p>
+            <a:pPr marL="0" indent="0" algn="just">
+              <a:lnSpc>
+                <a:spcPct val="150000"/>
+              </a:lnSpc>
+              <a:buNone/>
+            </a:pPr>
+            <a:r>
+              <a:rPr lang="en-US" dirty="0"/>
+              <a:t>2. </a:t>
+            </a:r>
+            <a:r>
+              <a:rPr lang="en-US" b="1" dirty="0"/>
+              <a:t>Class name:</a:t>
+            </a:r>
+            <a:r>
+              <a:rPr lang="en-US" dirty="0"/>
+              <a:t> By convention, a class name should begin with a capital letter and subsequent characters lowercased (for example Student). If a name consists of multiple words, the first letter of each word should be uppercased ( for example </a:t>
+            </a:r>
+            <a:r>
+              <a:rPr lang="en-US" dirty="0" err="1"/>
+              <a:t>CollegerStudent</a:t>
+            </a:r>
+            <a:r>
+              <a:rPr lang="en-US" dirty="0" smtClean="0"/>
+              <a:t>).</a:t>
+            </a:r>
+          </a:p>
+          <a:p>
+            <a:pPr marL="0" indent="0" algn="just">
+              <a:lnSpc>
+                <a:spcPct val="150000"/>
+              </a:lnSpc>
+              <a:buNone/>
+            </a:pPr>
+            <a:r>
+              <a:rPr lang="en-US" dirty="0"/>
+              <a:t>3. </a:t>
+            </a:r>
+            <a:r>
+              <a:rPr lang="en-US" b="1" dirty="0"/>
+              <a:t>Body:</a:t>
+            </a:r>
+            <a:r>
+              <a:rPr lang="en-US" dirty="0"/>
+              <a:t> Every class’s body is enclosed in a pair of left and right braces</a:t>
+            </a:r>
+            <a:r>
+              <a:rPr lang="en-US" dirty="0" smtClean="0"/>
+              <a:t>.</a:t>
+            </a:r>
+          </a:p>
+          <a:p>
+            <a:pPr marL="0" indent="0" algn="just">
+              <a:lnSpc>
+                <a:spcPct val="150000"/>
+              </a:lnSpc>
+              <a:buNone/>
+            </a:pPr>
+            <a:endParaRPr lang="en-US" dirty="0"/>
+          </a:p>
+          <a:p>
+            <a:pPr marL="0" indent="0" algn="just">
+              <a:lnSpc>
+                <a:spcPct val="150000"/>
+              </a:lnSpc>
+              <a:buNone/>
+            </a:pPr>
+            <a:r>
+              <a:rPr lang="en-US" b="1" dirty="0" smtClean="0"/>
+              <a:t>Note:</a:t>
+            </a:r>
+          </a:p>
+          <a:p>
+            <a:pPr marL="0" indent="0" algn="just">
+              <a:lnSpc>
+                <a:spcPct val="150000"/>
+              </a:lnSpc>
+              <a:buNone/>
+            </a:pPr>
+            <a:r>
+              <a:rPr lang="en-US" dirty="0" smtClean="0"/>
+              <a:t>A </a:t>
+            </a:r>
+            <a:r>
+              <a:rPr lang="en-US" dirty="0"/>
+              <a:t>class name can also start with an underscore ”_”. The following class name can be valid such as _, _Student. Keywords cannot be a valid class name. For example, class, true, null, </a:t>
+            </a:r>
+            <a:r>
+              <a:rPr lang="en-US" dirty="0" err="1"/>
+              <a:t>etc</a:t>
+            </a:r>
+            <a:r>
+              <a:rPr lang="en-US" dirty="0"/>
+              <a:t> are not accepted as a class name.</a:t>
+            </a:r>
+          </a:p>
+          <a:p>
+            <a:pPr algn="just">
+              <a:lnSpc>
+                <a:spcPct val="150000"/>
+              </a:lnSpc>
+            </a:pPr>
+            <a:endParaRPr lang="en-IN" dirty="0"/>
+          </a:p>
+        </p:txBody>
+      </p:sp>
+    </p:spTree>
+    <p:extLst>
+      <p:ext uri="{BB962C8B-B14F-4D97-AF65-F5344CB8AC3E}">
+        <p14:creationId xmlns:p14="http://schemas.microsoft.com/office/powerpoint/2010/main" val="436618539"/>
+      </p:ext>
+    </p:extLst>
+  </p:cSld>
+  <p:clrMapOvr>
+    <a:masterClrMapping/>
+  </p:clrMapOvr>
+</p:sld>
+</file>
+
+<file path=ppt/slides/slide13.xml><?xml version="1.0" encoding="utf-8"?>
 <p:sld xmlns:a="http://schemas.openxmlformats.org/drawingml/2006/main" xmlns:r="http://schemas.openxmlformats.org/officeDocument/2006/relationships" xmlns:p="http://schemas.openxmlformats.org/presentationml/2006/main">
   <p:cSld>
     <p:spTree>
@@ -14390,6 +14901,518 @@
 </file>
 
 <file path=ppt/slides/slide4.xml><?xml version="1.0" encoding="utf-8"?>
+<p:sld xmlns:a="http://schemas.openxmlformats.org/drawingml/2006/main" xmlns:r="http://schemas.openxmlformats.org/officeDocument/2006/relationships" xmlns:p="http://schemas.openxmlformats.org/presentationml/2006/main" showMasterSp="0">
+  <p:cSld>
+    <p:spTree>
+      <p:nvGrpSpPr>
+        <p:cNvPr id="1" name=""/>
+        <p:cNvGrpSpPr/>
+        <p:nvPr/>
+      </p:nvGrpSpPr>
+      <p:grpSpPr>
+        <a:xfrm>
+          <a:off x="0" y="0"/>
+          <a:ext cx="0" cy="0"/>
+          <a:chOff x="0" y="0"/>
+          <a:chExt cx="0" cy="0"/>
+        </a:xfrm>
+      </p:grpSpPr>
+      <p:sp>
+        <p:nvSpPr>
+          <p:cNvPr id="3" name="Content Placeholder 2"/>
+          <p:cNvSpPr>
+            <a:spLocks noGrp="1"/>
+          </p:cNvSpPr>
+          <p:nvPr>
+            <p:ph idx="1"/>
+          </p:nvPr>
+        </p:nvSpPr>
+        <p:spPr>
+          <a:xfrm>
+            <a:off x="365760" y="1322363"/>
+            <a:ext cx="10747717" cy="4881489"/>
+          </a:xfrm>
+        </p:spPr>
+        <p:txBody>
+          <a:bodyPr>
+            <a:normAutofit/>
+          </a:bodyPr>
+          <a:lstStyle/>
+          <a:p>
+            <a:r>
+              <a:rPr lang="en-US" sz="1400" dirty="0"/>
+              <a:t>We should know how objects are born, live their life, and then die at the end.</a:t>
+            </a:r>
+            <a:endParaRPr lang="en-IN" sz="1400" dirty="0"/>
+          </a:p>
+        </p:txBody>
+      </p:sp>
+      <p:sp>
+        <p:nvSpPr>
+          <p:cNvPr id="4" name="Rectangle 3"/>
+          <p:cNvSpPr/>
+          <p:nvPr/>
+        </p:nvSpPr>
+        <p:spPr>
+          <a:xfrm>
+            <a:off x="267286" y="232427"/>
+            <a:ext cx="11422966" cy="829994"/>
+          </a:xfrm>
+          <a:prstGeom prst="rect">
+            <a:avLst/>
+          </a:prstGeom>
+          <a:solidFill>
+            <a:schemeClr val="accent1">
+              <a:lumMod val="75000"/>
+            </a:schemeClr>
+          </a:solidFill>
+        </p:spPr>
+        <p:style>
+          <a:lnRef idx="2">
+            <a:schemeClr val="accent1">
+              <a:shade val="50000"/>
+            </a:schemeClr>
+          </a:lnRef>
+          <a:fillRef idx="1">
+            <a:schemeClr val="accent1"/>
+          </a:fillRef>
+          <a:effectRef idx="0">
+            <a:schemeClr val="accent1"/>
+          </a:effectRef>
+          <a:fontRef idx="minor">
+            <a:schemeClr val="lt1"/>
+          </a:fontRef>
+        </p:style>
+        <p:txBody>
+          <a:bodyPr rtlCol="0" anchor="ctr"/>
+          <a:lstStyle/>
+          <a:p>
+            <a:r>
+              <a:rPr lang="en-US" sz="3200" b="1" dirty="0">
+                <a:solidFill>
+                  <a:schemeClr val="bg1"/>
+                </a:solidFill>
+              </a:rPr>
+              <a:t>Life Cycle Of An Object</a:t>
+            </a:r>
+            <a:endParaRPr lang="en-IN" sz="3200" b="1" dirty="0">
+              <a:solidFill>
+                <a:schemeClr val="bg1"/>
+              </a:solidFill>
+            </a:endParaRPr>
+          </a:p>
+        </p:txBody>
+      </p:sp>
+      <p:pic>
+        <p:nvPicPr>
+          <p:cNvPr id="5" name="Picture 4"/>
+          <p:cNvPicPr>
+            <a:picLocks noChangeAspect="1"/>
+          </p:cNvPicPr>
+          <p:nvPr/>
+        </p:nvPicPr>
+        <p:blipFill>
+          <a:blip r:embed="rId2">
+            <a:extLst>
+              <a:ext uri="{BEBA8EAE-BF5A-486C-A8C5-ECC9F3942E4B}">
+                <a14:imgProps xmlns:a14="http://schemas.microsoft.com/office/drawing/2010/main">
+                  <a14:imgLayer r:embed="rId3">
+                    <a14:imgEffect>
+                      <a14:saturation sat="33000"/>
+                    </a14:imgEffect>
+                  </a14:imgLayer>
+                </a14:imgProps>
+              </a:ext>
+              <a:ext uri="{28A0092B-C50C-407E-A947-70E740481C1C}">
+                <a14:useLocalDpi xmlns:a14="http://schemas.microsoft.com/office/drawing/2010/main" val="0"/>
+              </a:ext>
+            </a:extLst>
+          </a:blip>
+          <a:stretch>
+            <a:fillRect/>
+          </a:stretch>
+        </p:blipFill>
+        <p:spPr>
+          <a:xfrm>
+            <a:off x="2378684" y="1768278"/>
+            <a:ext cx="6751248" cy="4794715"/>
+          </a:xfrm>
+          <a:prstGeom prst="rect">
+            <a:avLst/>
+          </a:prstGeom>
+        </p:spPr>
+      </p:pic>
+    </p:spTree>
+    <p:extLst>
+      <p:ext uri="{BB962C8B-B14F-4D97-AF65-F5344CB8AC3E}">
+        <p14:creationId xmlns:p14="http://schemas.microsoft.com/office/powerpoint/2010/main" val="3025653228"/>
+      </p:ext>
+    </p:extLst>
+  </p:cSld>
+  <p:clrMapOvr>
+    <a:masterClrMapping/>
+  </p:clrMapOvr>
+</p:sld>
+</file>
+
+<file path=ppt/slides/slide5.xml><?xml version="1.0" encoding="utf-8"?>
+<p:sld xmlns:a="http://schemas.openxmlformats.org/drawingml/2006/main" xmlns:r="http://schemas.openxmlformats.org/officeDocument/2006/relationships" xmlns:p="http://schemas.openxmlformats.org/presentationml/2006/main" showMasterSp="0">
+  <p:cSld>
+    <p:spTree>
+      <p:nvGrpSpPr>
+        <p:cNvPr id="1" name=""/>
+        <p:cNvGrpSpPr/>
+        <p:nvPr/>
+      </p:nvGrpSpPr>
+      <p:grpSpPr>
+        <a:xfrm>
+          <a:off x="0" y="0"/>
+          <a:ext cx="0" cy="0"/>
+          <a:chOff x="0" y="0"/>
+          <a:chExt cx="0" cy="0"/>
+        </a:xfrm>
+      </p:grpSpPr>
+      <p:sp>
+        <p:nvSpPr>
+          <p:cNvPr id="3" name="Content Placeholder 2"/>
+          <p:cNvSpPr>
+            <a:spLocks noGrp="1"/>
+          </p:cNvSpPr>
+          <p:nvPr>
+            <p:ph idx="1"/>
+          </p:nvPr>
+        </p:nvSpPr>
+        <p:spPr>
+          <a:xfrm>
+            <a:off x="464234" y="351692"/>
+            <a:ext cx="11141613" cy="6006904"/>
+          </a:xfrm>
+        </p:spPr>
+        <p:txBody>
+          <a:bodyPr>
+            <a:noAutofit/>
+          </a:bodyPr>
+          <a:lstStyle/>
+          <a:p>
+            <a:pPr algn="just">
+              <a:lnSpc>
+                <a:spcPct val="160000"/>
+              </a:lnSpc>
+            </a:pPr>
+            <a:r>
+              <a:rPr lang="en-US" sz="1400" b="1" dirty="0"/>
+              <a:t>Step 1:</a:t>
+            </a:r>
+            <a:r>
+              <a:rPr lang="en-US" sz="1400" dirty="0"/>
+              <a:t> Creation of .class file on disk</a:t>
+            </a:r>
+          </a:p>
+          <a:p>
+            <a:pPr algn="just">
+              <a:lnSpc>
+                <a:spcPct val="160000"/>
+              </a:lnSpc>
+            </a:pPr>
+            <a:r>
+              <a:rPr lang="en-US" sz="1400" dirty="0"/>
+              <a:t>As you know that Java programs run on the Java virtual machine (JVM). When we compile the Java class, it is transformed into byte code which is platform and machine-independent. The compiled classes are stored as a .class file on a disk.</a:t>
+            </a:r>
+          </a:p>
+          <a:p>
+            <a:pPr algn="just">
+              <a:lnSpc>
+                <a:spcPct val="160000"/>
+              </a:lnSpc>
+            </a:pPr>
+            <a:r>
+              <a:rPr lang="en-US" sz="1400" b="1" dirty="0"/>
+              <a:t>Step 2:</a:t>
+            </a:r>
+            <a:r>
+              <a:rPr lang="en-US" sz="1400" dirty="0"/>
+              <a:t> Loading .class file into memory</a:t>
+            </a:r>
+          </a:p>
+          <a:p>
+            <a:pPr algn="just">
+              <a:lnSpc>
+                <a:spcPct val="160000"/>
+              </a:lnSpc>
+            </a:pPr>
+            <a:r>
+              <a:rPr lang="en-US" sz="1400" dirty="0"/>
+              <a:t>After that, the Java runtime finds out that class on the disk that is in the form of a .class file. Java </a:t>
+            </a:r>
+            <a:r>
+              <a:rPr lang="en-US" sz="1400" dirty="0" err="1"/>
+              <a:t>classloader</a:t>
+            </a:r>
+            <a:r>
+              <a:rPr lang="en-US" sz="1400" dirty="0"/>
+              <a:t> loads that class into memory and then  Java runtime reads it into the memory.</a:t>
+            </a:r>
+          </a:p>
+          <a:p>
+            <a:pPr algn="just">
+              <a:lnSpc>
+                <a:spcPct val="160000"/>
+              </a:lnSpc>
+            </a:pPr>
+            <a:r>
+              <a:rPr lang="en-US" sz="1400" b="1" dirty="0"/>
+              <a:t>Step 3:</a:t>
+            </a:r>
+            <a:r>
+              <a:rPr lang="en-US" sz="1400" dirty="0"/>
+              <a:t> Looking for initialized static members of class</a:t>
+            </a:r>
+          </a:p>
+          <a:p>
+            <a:pPr algn="just">
+              <a:lnSpc>
+                <a:spcPct val="160000"/>
+              </a:lnSpc>
+            </a:pPr>
+            <a:r>
+              <a:rPr lang="en-US" sz="1400" dirty="0"/>
+              <a:t>Now Java looks for all initialized static members of the class such as static method, static field, and static block.</a:t>
+            </a:r>
+          </a:p>
+          <a:p>
+            <a:pPr algn="just">
+              <a:lnSpc>
+                <a:spcPct val="160000"/>
+              </a:lnSpc>
+            </a:pPr>
+            <a:r>
+              <a:rPr lang="en-US" sz="1400" dirty="0"/>
+              <a:t>You always remember that all the static members of the class do not belong to any particular instance of the class. It belongs to the class itself and is shared by all the objects created from the class.</a:t>
+            </a:r>
+          </a:p>
+          <a:p>
+            <a:pPr algn="just">
+              <a:lnSpc>
+                <a:spcPct val="160000"/>
+              </a:lnSpc>
+            </a:pPr>
+            <a:r>
+              <a:rPr lang="en-US" sz="1400" b="1" dirty="0"/>
+              <a:t>Step 4:</a:t>
+            </a:r>
+            <a:r>
+              <a:rPr lang="en-US" sz="1400" dirty="0"/>
+              <a:t> Ways to initialize class in java</a:t>
+            </a:r>
+          </a:p>
+          <a:p>
+            <a:pPr algn="just">
+              <a:lnSpc>
+                <a:spcPct val="160000"/>
+              </a:lnSpc>
+            </a:pPr>
+            <a:r>
+              <a:rPr lang="en-US" sz="1400" dirty="0"/>
+              <a:t>A class can be initialized in two ways in Java. First, when you access a static field or static method of the class.</a:t>
+            </a:r>
+          </a:p>
+          <a:p>
+            <a:pPr algn="just">
+              <a:lnSpc>
+                <a:spcPct val="160000"/>
+              </a:lnSpc>
+            </a:pPr>
+            <a:r>
+              <a:rPr lang="en-US" sz="1400" dirty="0"/>
+              <a:t>For example, when you run the main method in a class, the class is initialized because the main method is static and the second way is when object or instance of the class is created using the new keyword, the class is initialized</a:t>
+            </a:r>
+            <a:r>
+              <a:rPr lang="en-US" sz="1400" dirty="0" smtClean="0"/>
+              <a:t>.</a:t>
+            </a:r>
+            <a:endParaRPr lang="en-US" sz="1400" dirty="0"/>
+          </a:p>
+        </p:txBody>
+      </p:sp>
+    </p:spTree>
+    <p:extLst>
+      <p:ext uri="{BB962C8B-B14F-4D97-AF65-F5344CB8AC3E}">
+        <p14:creationId xmlns:p14="http://schemas.microsoft.com/office/powerpoint/2010/main" val="87888218"/>
+      </p:ext>
+    </p:extLst>
+  </p:cSld>
+  <p:clrMapOvr>
+    <a:masterClrMapping/>
+  </p:clrMapOvr>
+  <p:timing>
+    <p:tnLst>
+      <p:par>
+        <p:cTn id="1" dur="indefinite" restart="never" nodeType="tmRoot"/>
+      </p:par>
+    </p:tnLst>
+  </p:timing>
+</p:sld>
+</file>
+
+<file path=ppt/slides/slide6.xml><?xml version="1.0" encoding="utf-8"?>
+<p:sld xmlns:a="http://schemas.openxmlformats.org/drawingml/2006/main" xmlns:r="http://schemas.openxmlformats.org/officeDocument/2006/relationships" xmlns:p="http://schemas.openxmlformats.org/presentationml/2006/main" showMasterSp="0">
+  <p:cSld>
+    <p:spTree>
+      <p:nvGrpSpPr>
+        <p:cNvPr id="1" name=""/>
+        <p:cNvGrpSpPr/>
+        <p:nvPr/>
+      </p:nvGrpSpPr>
+      <p:grpSpPr>
+        <a:xfrm>
+          <a:off x="0" y="0"/>
+          <a:ext cx="0" cy="0"/>
+          <a:chOff x="0" y="0"/>
+          <a:chExt cx="0" cy="0"/>
+        </a:xfrm>
+      </p:grpSpPr>
+      <p:sp>
+        <p:nvSpPr>
+          <p:cNvPr id="3" name="Content Placeholder 2"/>
+          <p:cNvSpPr>
+            <a:spLocks noGrp="1"/>
+          </p:cNvSpPr>
+          <p:nvPr>
+            <p:ph idx="1"/>
+          </p:nvPr>
+        </p:nvSpPr>
+        <p:spPr>
+          <a:xfrm>
+            <a:off x="492369" y="351692"/>
+            <a:ext cx="10860259" cy="5922499"/>
+          </a:xfrm>
+        </p:spPr>
+        <p:txBody>
+          <a:bodyPr>
+            <a:normAutofit/>
+          </a:bodyPr>
+          <a:lstStyle/>
+          <a:p>
+            <a:pPr algn="just">
+              <a:lnSpc>
+                <a:spcPct val="150000"/>
+              </a:lnSpc>
+            </a:pPr>
+            <a:r>
+              <a:rPr lang="en-US" b="1" dirty="0"/>
+              <a:t>Step 5:</a:t>
+            </a:r>
+            <a:r>
+              <a:rPr lang="en-US" dirty="0"/>
+              <a:t> Allocation of memory for object and reference variable</a:t>
+            </a:r>
+          </a:p>
+          <a:p>
+            <a:pPr algn="just">
+              <a:lnSpc>
+                <a:spcPct val="150000"/>
+              </a:lnSpc>
+            </a:pPr>
+            <a:r>
+              <a:rPr lang="en-US" dirty="0"/>
+              <a:t>In stage 5, Java allocates the memory on the heap for the object and memory on the stack for object reference variable.</a:t>
+            </a:r>
+          </a:p>
+          <a:p>
+            <a:pPr algn="just">
+              <a:lnSpc>
+                <a:spcPct val="150000"/>
+              </a:lnSpc>
+            </a:pPr>
+            <a:r>
+              <a:rPr lang="en-US" b="1" dirty="0"/>
+              <a:t>Step 6:</a:t>
+            </a:r>
+            <a:r>
+              <a:rPr lang="en-US" dirty="0"/>
+              <a:t> Calling of the constructor of class</a:t>
+            </a:r>
+          </a:p>
+          <a:p>
+            <a:pPr algn="just">
+              <a:lnSpc>
+                <a:spcPct val="150000"/>
+              </a:lnSpc>
+            </a:pPr>
+            <a:r>
+              <a:rPr lang="en-US" dirty="0"/>
+              <a:t>After allocating the memory, JVM calls the constructor of the class which is like a method but it is called only once when the object is created.</a:t>
+            </a:r>
+          </a:p>
+          <a:p>
+            <a:pPr algn="just">
+              <a:lnSpc>
+                <a:spcPct val="150000"/>
+              </a:lnSpc>
+            </a:pPr>
+            <a:r>
+              <a:rPr lang="en-US" b="1" dirty="0"/>
+              <a:t>Step 7:</a:t>
+            </a:r>
+            <a:r>
+              <a:rPr lang="en-US" dirty="0"/>
+              <a:t> Removing of object and reference variable from memory</a:t>
+            </a:r>
+          </a:p>
+          <a:p>
+            <a:pPr algn="just">
+              <a:lnSpc>
+                <a:spcPct val="150000"/>
+              </a:lnSpc>
+            </a:pPr>
+            <a:r>
+              <a:rPr lang="en-US" dirty="0"/>
+              <a:t>When the accessing of field and methods are completed, the object and its reference are removed from the memory by the JVM. At this time the object has died.</a:t>
+            </a:r>
+          </a:p>
+          <a:p>
+            <a:pPr algn="just">
+              <a:lnSpc>
+                <a:spcPct val="150000"/>
+              </a:lnSpc>
+            </a:pPr>
+            <a:r>
+              <a:rPr lang="en-US" dirty="0"/>
+              <a:t>You don’t have to destroy objects yourself. Actually, when the object is no longer in use, Java runtime calls the garbage collector to destroy all the objects. Thus, objects are born, live, a</a:t>
+            </a:r>
+          </a:p>
+          <a:p>
+            <a:pPr algn="just">
+              <a:lnSpc>
+                <a:spcPct val="150000"/>
+              </a:lnSpc>
+            </a:pPr>
+            <a:endParaRPr lang="en-IN" dirty="0"/>
+          </a:p>
+          <a:p>
+            <a:pPr algn="just">
+              <a:lnSpc>
+                <a:spcPct val="150000"/>
+              </a:lnSpc>
+            </a:pPr>
+            <a:endParaRPr lang="en-IN" dirty="0"/>
+          </a:p>
+        </p:txBody>
+      </p:sp>
+    </p:spTree>
+    <p:extLst>
+      <p:ext uri="{BB962C8B-B14F-4D97-AF65-F5344CB8AC3E}">
+        <p14:creationId xmlns:p14="http://schemas.microsoft.com/office/powerpoint/2010/main" val="1825526517"/>
+      </p:ext>
+    </p:extLst>
+  </p:cSld>
+  <p:clrMapOvr>
+    <a:masterClrMapping/>
+  </p:clrMapOvr>
+</p:sld>
+</file>
+
+<file path=ppt/slides/slide7.xml><?xml version="1.0" encoding="utf-8"?>
 <p:sld xmlns:a="http://schemas.openxmlformats.org/drawingml/2006/main" xmlns:r="http://schemas.openxmlformats.org/officeDocument/2006/relationships" xmlns:p="http://schemas.openxmlformats.org/presentationml/2006/main">
   <p:cSld>
     <p:spTree>
@@ -14544,7 +15567,7 @@
 </p:sld>
 </file>
 
-<file path=ppt/slides/slide5.xml><?xml version="1.0" encoding="utf-8"?>
+<file path=ppt/slides/slide8.xml><?xml version="1.0" encoding="utf-8"?>
 <p:sld xmlns:a="http://schemas.openxmlformats.org/drawingml/2006/main" xmlns:r="http://schemas.openxmlformats.org/officeDocument/2006/relationships" xmlns:p="http://schemas.openxmlformats.org/presentationml/2006/main">
   <p:cSld>
     <p:spTree>
@@ -14630,7 +15653,7 @@
 </p:sld>
 </file>
 
-<file path=ppt/slides/slide6.xml><?xml version="1.0" encoding="utf-8"?>
+<file path=ppt/slides/slide9.xml><?xml version="1.0" encoding="utf-8"?>
 <p:sld xmlns:a="http://schemas.openxmlformats.org/drawingml/2006/main" xmlns:r="http://schemas.openxmlformats.org/officeDocument/2006/relationships" xmlns:p="http://schemas.openxmlformats.org/presentationml/2006/main">
   <p:cSld>
     <p:spTree>
@@ -14702,502 +15725,6 @@
     <p:extLst>
       <p:ext uri="{BB962C8B-B14F-4D97-AF65-F5344CB8AC3E}">
         <p14:creationId xmlns:p14="http://schemas.microsoft.com/office/powerpoint/2010/main" val="1667670338"/>
-      </p:ext>
-    </p:extLst>
-  </p:cSld>
-  <p:clrMapOvr>
-    <a:masterClrMapping/>
-  </p:clrMapOvr>
-</p:sld>
-</file>
-
-<file path=ppt/slides/slide7.xml><?xml version="1.0" encoding="utf-8"?>
-<p:sld xmlns:a="http://schemas.openxmlformats.org/drawingml/2006/main" xmlns:r="http://schemas.openxmlformats.org/officeDocument/2006/relationships" xmlns:p="http://schemas.openxmlformats.org/presentationml/2006/main">
-  <p:cSld>
-    <p:spTree>
-      <p:nvGrpSpPr>
-        <p:cNvPr id="1" name=""/>
-        <p:cNvGrpSpPr/>
-        <p:nvPr/>
-      </p:nvGrpSpPr>
-      <p:grpSpPr>
-        <a:xfrm>
-          <a:off x="0" y="0"/>
-          <a:ext cx="0" cy="0"/>
-          <a:chOff x="0" y="0"/>
-          <a:chExt cx="0" cy="0"/>
-        </a:xfrm>
-      </p:grpSpPr>
-      <p:sp>
-        <p:nvSpPr>
-          <p:cNvPr id="2" name="Title 1"/>
-          <p:cNvSpPr>
-            <a:spLocks noGrp="1"/>
-          </p:cNvSpPr>
-          <p:nvPr>
-            <p:ph type="title"/>
-          </p:nvPr>
-        </p:nvSpPr>
-        <p:spPr>
-          <a:xfrm>
-            <a:off x="585110" y="695372"/>
-            <a:ext cx="8761413" cy="706964"/>
-          </a:xfrm>
-        </p:spPr>
-        <p:txBody>
-          <a:bodyPr/>
-          <a:lstStyle/>
-          <a:p>
-            <a:r>
-              <a:rPr lang="en-US" b="1" dirty="0" smtClean="0"/>
-              <a:t>What is Class?</a:t>
-            </a:r>
-            <a:endParaRPr lang="en-IN" b="1" dirty="0"/>
-          </a:p>
-        </p:txBody>
-      </p:sp>
-      <p:sp>
-        <p:nvSpPr>
-          <p:cNvPr id="3" name="Content Placeholder 2"/>
-          <p:cNvSpPr>
-            <a:spLocks noGrp="1"/>
-          </p:cNvSpPr>
-          <p:nvPr>
-            <p:ph idx="1"/>
-          </p:nvPr>
-        </p:nvSpPr>
-        <p:spPr>
-          <a:xfrm>
-            <a:off x="585110" y="2266123"/>
-            <a:ext cx="10838264" cy="4121426"/>
-          </a:xfrm>
-        </p:spPr>
-        <p:txBody>
-          <a:bodyPr>
-            <a:normAutofit fontScale="85000" lnSpcReduction="20000"/>
-          </a:bodyPr>
-          <a:lstStyle/>
-          <a:p>
-            <a:pPr algn="just">
-              <a:lnSpc>
-                <a:spcPct val="120000"/>
-              </a:lnSpc>
-            </a:pPr>
-            <a:r>
-              <a:rPr lang="en-US" sz="2000" dirty="0" smtClean="0"/>
-              <a:t>Class is a blue print of an object</a:t>
-            </a:r>
-            <a:r>
-              <a:rPr lang="en-IN" sz="2000" dirty="0" smtClean="0"/>
-              <a:t>.</a:t>
-            </a:r>
-          </a:p>
-          <a:p>
-            <a:pPr algn="just">
-              <a:lnSpc>
-                <a:spcPct val="120000"/>
-              </a:lnSpc>
-            </a:pPr>
-            <a:r>
-              <a:rPr lang="en-US" sz="2000" dirty="0"/>
-              <a:t>A </a:t>
-            </a:r>
-            <a:r>
-              <a:rPr lang="en-US" sz="2000" b="1" dirty="0"/>
-              <a:t>class in Java</a:t>
-            </a:r>
-            <a:r>
-              <a:rPr lang="en-US" sz="2000" dirty="0"/>
-              <a:t> is a fundamental building block of object-oriented programming (OOP) language. In other words, a class is the basic unit of OOP.</a:t>
-            </a:r>
-          </a:p>
-          <a:p>
-            <a:pPr algn="just">
-              <a:lnSpc>
-                <a:spcPct val="120000"/>
-              </a:lnSpc>
-            </a:pPr>
-            <a:r>
-              <a:rPr lang="en-US" sz="2000" dirty="0"/>
-              <a:t>According to OOPs concept in Java, a class is the blueprint/template of an object. It contains the similar types of objects having the same states (properties) and behavior.</a:t>
-            </a:r>
-          </a:p>
-          <a:p>
-            <a:pPr algn="just">
-              <a:lnSpc>
-                <a:spcPct val="120000"/>
-              </a:lnSpc>
-            </a:pPr>
-            <a:r>
-              <a:rPr lang="en-US" sz="2000" dirty="0"/>
-              <a:t>In other words, a class can also be defined as “a class is a group of objects which are common to all objects of one type</a:t>
-            </a:r>
-            <a:r>
-              <a:rPr lang="en-US" sz="2000" dirty="0" smtClean="0"/>
-              <a:t>”.</a:t>
-            </a:r>
-          </a:p>
-          <a:p>
-            <a:pPr algn="just">
-              <a:lnSpc>
-                <a:spcPct val="120000"/>
-              </a:lnSpc>
-            </a:pPr>
-            <a:r>
-              <a:rPr lang="en-US" b="1" dirty="0"/>
-              <a:t>Syntax to Declare Class in Java</a:t>
-            </a:r>
-          </a:p>
-          <a:p>
-            <a:pPr lvl="1" algn="just">
-              <a:lnSpc>
-                <a:spcPct val="120000"/>
-              </a:lnSpc>
-            </a:pPr>
-            <a:r>
-              <a:rPr lang="en-US" sz="1800" dirty="0" err="1" smtClean="0"/>
-              <a:t>access_modifier</a:t>
-            </a:r>
-            <a:r>
-              <a:rPr lang="en-US" sz="1800" dirty="0" smtClean="0"/>
-              <a:t> </a:t>
-            </a:r>
-            <a:r>
-              <a:rPr lang="en-US" sz="1800" dirty="0" err="1" smtClean="0"/>
-              <a:t>Class_Name</a:t>
-            </a:r>
-            <a:endParaRPr lang="en-US" sz="1800" dirty="0" smtClean="0"/>
-          </a:p>
-          <a:p>
-            <a:pPr lvl="1" algn="just">
-              <a:lnSpc>
-                <a:spcPct val="120000"/>
-              </a:lnSpc>
-            </a:pPr>
-            <a:r>
-              <a:rPr lang="en-US" sz="1800" dirty="0" smtClean="0"/>
-              <a:t>{</a:t>
-            </a:r>
-          </a:p>
-          <a:p>
-            <a:pPr marL="457200" lvl="1" indent="0" algn="just">
-              <a:lnSpc>
-                <a:spcPct val="120000"/>
-              </a:lnSpc>
-              <a:buNone/>
-            </a:pPr>
-            <a:r>
-              <a:rPr lang="en-US" sz="1800" dirty="0" smtClean="0"/>
-              <a:t>		// class body</a:t>
-            </a:r>
-            <a:endParaRPr lang="en-US" sz="1800" dirty="0"/>
-          </a:p>
-          <a:p>
-            <a:pPr lvl="1" algn="just">
-              <a:lnSpc>
-                <a:spcPct val="120000"/>
-              </a:lnSpc>
-            </a:pPr>
-            <a:r>
-              <a:rPr lang="en-US" sz="1800" dirty="0" smtClean="0"/>
-              <a:t>}</a:t>
-            </a:r>
-          </a:p>
-          <a:p>
-            <a:pPr marL="0" indent="0" algn="just">
-              <a:lnSpc>
-                <a:spcPct val="120000"/>
-              </a:lnSpc>
-              <a:buNone/>
-            </a:pPr>
-            <a:endParaRPr lang="en-US" sz="2000" dirty="0"/>
-          </a:p>
-          <a:p>
-            <a:pPr algn="just">
-              <a:lnSpc>
-                <a:spcPct val="120000"/>
-              </a:lnSpc>
-            </a:pPr>
-            <a:endParaRPr lang="en-US" sz="2000" dirty="0" smtClean="0"/>
-          </a:p>
-        </p:txBody>
-      </p:sp>
-    </p:spTree>
-    <p:extLst>
-      <p:ext uri="{BB962C8B-B14F-4D97-AF65-F5344CB8AC3E}">
-        <p14:creationId xmlns:p14="http://schemas.microsoft.com/office/powerpoint/2010/main" val="3451203344"/>
-      </p:ext>
-    </p:extLst>
-  </p:cSld>
-  <p:clrMapOvr>
-    <a:masterClrMapping/>
-  </p:clrMapOvr>
-</p:sld>
-</file>
-
-<file path=ppt/slides/slide8.xml><?xml version="1.0" encoding="utf-8"?>
-<p:sld xmlns:a="http://schemas.openxmlformats.org/drawingml/2006/main" xmlns:r="http://schemas.openxmlformats.org/officeDocument/2006/relationships" xmlns:p="http://schemas.openxmlformats.org/presentationml/2006/main">
-  <p:cSld>
-    <p:spTree>
-      <p:nvGrpSpPr>
-        <p:cNvPr id="1" name=""/>
-        <p:cNvGrpSpPr/>
-        <p:nvPr/>
-      </p:nvGrpSpPr>
-      <p:grpSpPr>
-        <a:xfrm>
-          <a:off x="0" y="0"/>
-          <a:ext cx="0" cy="0"/>
-          <a:chOff x="0" y="0"/>
-          <a:chExt cx="0" cy="0"/>
-        </a:xfrm>
-      </p:grpSpPr>
-      <p:sp>
-        <p:nvSpPr>
-          <p:cNvPr id="2" name="Title 1"/>
-          <p:cNvSpPr>
-            <a:spLocks noGrp="1"/>
-          </p:cNvSpPr>
-          <p:nvPr>
-            <p:ph type="title"/>
-          </p:nvPr>
-        </p:nvSpPr>
-        <p:spPr>
-          <a:xfrm>
-            <a:off x="677874" y="854398"/>
-            <a:ext cx="8761413" cy="706964"/>
-          </a:xfrm>
-        </p:spPr>
-        <p:txBody>
-          <a:bodyPr/>
-          <a:lstStyle/>
-          <a:p>
-            <a:r>
-              <a:rPr lang="en-US" b="1" dirty="0" smtClean="0"/>
-              <a:t>Components Of Class</a:t>
-            </a:r>
-            <a:endParaRPr lang="en-IN" b="1" dirty="0"/>
-          </a:p>
-        </p:txBody>
-      </p:sp>
-      <p:pic>
-        <p:nvPicPr>
-          <p:cNvPr id="4" name="Content Placeholder 3"/>
-          <p:cNvPicPr>
-            <a:picLocks noGrp="1" noChangeAspect="1"/>
-          </p:cNvPicPr>
-          <p:nvPr>
-            <p:ph idx="1"/>
-          </p:nvPr>
-        </p:nvPicPr>
-        <p:blipFill>
-          <a:blip r:embed="rId2">
-            <a:duotone>
-              <a:schemeClr val="accent1">
-                <a:shade val="45000"/>
-                <a:satMod val="135000"/>
-              </a:schemeClr>
-              <a:prstClr val="white"/>
-            </a:duotone>
-            <a:extLst>
-              <a:ext uri="{28A0092B-C50C-407E-A947-70E740481C1C}">
-                <a14:useLocalDpi xmlns:a14="http://schemas.microsoft.com/office/drawing/2010/main" val="0"/>
-              </a:ext>
-            </a:extLst>
-          </a:blip>
-          <a:stretch>
-            <a:fillRect/>
-          </a:stretch>
-        </p:blipFill>
-        <p:spPr>
-          <a:xfrm>
-            <a:off x="2637184" y="2419135"/>
-            <a:ext cx="6016486" cy="4272889"/>
-          </a:xfrm>
-        </p:spPr>
-      </p:pic>
-    </p:spTree>
-    <p:extLst>
-      <p:ext uri="{BB962C8B-B14F-4D97-AF65-F5344CB8AC3E}">
-        <p14:creationId xmlns:p14="http://schemas.microsoft.com/office/powerpoint/2010/main" val="76220320"/>
-      </p:ext>
-    </p:extLst>
-  </p:cSld>
-  <p:clrMapOvr>
-    <a:masterClrMapping/>
-  </p:clrMapOvr>
-</p:sld>
-</file>
-
-<file path=ppt/slides/slide9.xml><?xml version="1.0" encoding="utf-8"?>
-<p:sld xmlns:a="http://schemas.openxmlformats.org/drawingml/2006/main" xmlns:r="http://schemas.openxmlformats.org/officeDocument/2006/relationships" xmlns:p="http://schemas.openxmlformats.org/presentationml/2006/main">
-  <p:cSld>
-    <p:spTree>
-      <p:nvGrpSpPr>
-        <p:cNvPr id="1" name=""/>
-        <p:cNvGrpSpPr/>
-        <p:nvPr/>
-      </p:nvGrpSpPr>
-      <p:grpSpPr>
-        <a:xfrm>
-          <a:off x="0" y="0"/>
-          <a:ext cx="0" cy="0"/>
-          <a:chOff x="0" y="0"/>
-          <a:chExt cx="0" cy="0"/>
-        </a:xfrm>
-      </p:grpSpPr>
-      <p:sp>
-        <p:nvSpPr>
-          <p:cNvPr id="3" name="Content Placeholder 2"/>
-          <p:cNvSpPr>
-            <a:spLocks noGrp="1"/>
-          </p:cNvSpPr>
-          <p:nvPr>
-            <p:ph idx="1"/>
-          </p:nvPr>
-        </p:nvSpPr>
-        <p:spPr>
-          <a:xfrm>
-            <a:off x="424070" y="2411896"/>
-            <a:ext cx="11158330" cy="4280452"/>
-          </a:xfrm>
-        </p:spPr>
-        <p:txBody>
-          <a:bodyPr>
-            <a:normAutofit fontScale="85000" lnSpcReduction="10000"/>
-          </a:bodyPr>
-          <a:lstStyle/>
-          <a:p>
-            <a:pPr marL="0" indent="0" algn="just">
-              <a:lnSpc>
-                <a:spcPct val="150000"/>
-              </a:lnSpc>
-              <a:buNone/>
-            </a:pPr>
-            <a:r>
-              <a:rPr lang="en-US" dirty="0"/>
-              <a:t>1. </a:t>
-            </a:r>
-            <a:r>
-              <a:rPr lang="en-US" b="1" dirty="0"/>
-              <a:t>Modifiers:</a:t>
-            </a:r>
-            <a:r>
-              <a:rPr lang="en-US" dirty="0"/>
-              <a:t> A class can be either a public or default access modifier. But the members of class can be public, private, default, and protected. All these are the access modifiers.</a:t>
-            </a:r>
-          </a:p>
-          <a:p>
-            <a:pPr marL="0" indent="0" algn="just">
-              <a:lnSpc>
-                <a:spcPct val="150000"/>
-              </a:lnSpc>
-              <a:buNone/>
-            </a:pPr>
-            <a:r>
-              <a:rPr lang="en-US" dirty="0"/>
-              <a:t>2. </a:t>
-            </a:r>
-            <a:r>
-              <a:rPr lang="en-US" b="1" dirty="0"/>
-              <a:t>Class name:</a:t>
-            </a:r>
-            <a:r>
-              <a:rPr lang="en-US" dirty="0"/>
-              <a:t> By convention, a class name should begin with a capital letter and subsequent characters lowercased (for example Student). If a name consists of multiple words, the first letter of each word should be uppercased ( for example </a:t>
-            </a:r>
-            <a:r>
-              <a:rPr lang="en-US" dirty="0" err="1"/>
-              <a:t>CollegerStudent</a:t>
-            </a:r>
-            <a:r>
-              <a:rPr lang="en-US" dirty="0" smtClean="0"/>
-              <a:t>).</a:t>
-            </a:r>
-          </a:p>
-          <a:p>
-            <a:pPr marL="0" indent="0" algn="just">
-              <a:lnSpc>
-                <a:spcPct val="150000"/>
-              </a:lnSpc>
-              <a:buNone/>
-            </a:pPr>
-            <a:r>
-              <a:rPr lang="en-US" dirty="0"/>
-              <a:t>3. </a:t>
-            </a:r>
-            <a:r>
-              <a:rPr lang="en-US" b="1" dirty="0"/>
-              <a:t>Body:</a:t>
-            </a:r>
-            <a:r>
-              <a:rPr lang="en-US" dirty="0"/>
-              <a:t> Every class’s body is enclosed in a pair of left and right braces</a:t>
-            </a:r>
-            <a:r>
-              <a:rPr lang="en-US" dirty="0" smtClean="0"/>
-              <a:t>.</a:t>
-            </a:r>
-          </a:p>
-          <a:p>
-            <a:pPr marL="0" indent="0" algn="just">
-              <a:lnSpc>
-                <a:spcPct val="150000"/>
-              </a:lnSpc>
-              <a:buNone/>
-            </a:pPr>
-            <a:endParaRPr lang="en-US" dirty="0"/>
-          </a:p>
-          <a:p>
-            <a:pPr marL="0" indent="0" algn="just">
-              <a:lnSpc>
-                <a:spcPct val="150000"/>
-              </a:lnSpc>
-              <a:buNone/>
-            </a:pPr>
-            <a:r>
-              <a:rPr lang="en-US" b="1" dirty="0" smtClean="0"/>
-              <a:t>Note:</a:t>
-            </a:r>
-          </a:p>
-          <a:p>
-            <a:pPr marL="0" indent="0" algn="just">
-              <a:lnSpc>
-                <a:spcPct val="150000"/>
-              </a:lnSpc>
-              <a:buNone/>
-            </a:pPr>
-            <a:r>
-              <a:rPr lang="en-US" dirty="0" smtClean="0"/>
-              <a:t>A </a:t>
-            </a:r>
-            <a:r>
-              <a:rPr lang="en-US" dirty="0"/>
-              <a:t>class name can also start with an underscore ”_”. The following class name can be valid such as _, _Student. Keywords cannot be a valid class name. For example, class, true, null, </a:t>
-            </a:r>
-            <a:r>
-              <a:rPr lang="en-US" dirty="0" err="1"/>
-              <a:t>etc</a:t>
-            </a:r>
-            <a:r>
-              <a:rPr lang="en-US" dirty="0"/>
-              <a:t> are not accepted as a class name.</a:t>
-            </a:r>
-          </a:p>
-          <a:p>
-            <a:pPr algn="just">
-              <a:lnSpc>
-                <a:spcPct val="150000"/>
-              </a:lnSpc>
-            </a:pPr>
-            <a:endParaRPr lang="en-IN" dirty="0"/>
-          </a:p>
-        </p:txBody>
-      </p:sp>
-    </p:spTree>
-    <p:extLst>
-      <p:ext uri="{BB962C8B-B14F-4D97-AF65-F5344CB8AC3E}">
-        <p14:creationId xmlns:p14="http://schemas.microsoft.com/office/powerpoint/2010/main" val="436618539"/>
       </p:ext>
     </p:extLst>
   </p:cSld>

</xml_diff>